<commit_message>
Added some corrections in my report
</commit_message>
<xml_diff>
--- a/Documents/Project report Vero/figures/APA_analysis/axesFP.pptx
+++ b/Documents/Project report Vero/figures/APA_analysis/axesFP.pptx
@@ -288,7 +288,7 @@
           <a:p>
             <a:fld id="{0835606E-567B-4A60-9BAE-353B30461873}" type="datetimeFigureOut">
               <a:rPr lang="es-ES" smtClean="0"/>
-              <a:t>18/05/2015</a:t>
+              <a:t>24/05/2015</a:t>
             </a:fld>
             <a:endParaRPr lang="es-ES"/>
           </a:p>
@@ -458,7 +458,7 @@
           <a:p>
             <a:fld id="{0835606E-567B-4A60-9BAE-353B30461873}" type="datetimeFigureOut">
               <a:rPr lang="es-ES" smtClean="0"/>
-              <a:t>18/05/2015</a:t>
+              <a:t>24/05/2015</a:t>
             </a:fld>
             <a:endParaRPr lang="es-ES"/>
           </a:p>
@@ -638,7 +638,7 @@
           <a:p>
             <a:fld id="{0835606E-567B-4A60-9BAE-353B30461873}" type="datetimeFigureOut">
               <a:rPr lang="es-ES" smtClean="0"/>
-              <a:t>18/05/2015</a:t>
+              <a:t>24/05/2015</a:t>
             </a:fld>
             <a:endParaRPr lang="es-ES"/>
           </a:p>
@@ -808,7 +808,7 @@
           <a:p>
             <a:fld id="{0835606E-567B-4A60-9BAE-353B30461873}" type="datetimeFigureOut">
               <a:rPr lang="es-ES" smtClean="0"/>
-              <a:t>18/05/2015</a:t>
+              <a:t>24/05/2015</a:t>
             </a:fld>
             <a:endParaRPr lang="es-ES"/>
           </a:p>
@@ -1054,7 +1054,7 @@
           <a:p>
             <a:fld id="{0835606E-567B-4A60-9BAE-353B30461873}" type="datetimeFigureOut">
               <a:rPr lang="es-ES" smtClean="0"/>
-              <a:t>18/05/2015</a:t>
+              <a:t>24/05/2015</a:t>
             </a:fld>
             <a:endParaRPr lang="es-ES"/>
           </a:p>
@@ -1342,7 +1342,7 @@
           <a:p>
             <a:fld id="{0835606E-567B-4A60-9BAE-353B30461873}" type="datetimeFigureOut">
               <a:rPr lang="es-ES" smtClean="0"/>
-              <a:t>18/05/2015</a:t>
+              <a:t>24/05/2015</a:t>
             </a:fld>
             <a:endParaRPr lang="es-ES"/>
           </a:p>
@@ -1764,7 +1764,7 @@
           <a:p>
             <a:fld id="{0835606E-567B-4A60-9BAE-353B30461873}" type="datetimeFigureOut">
               <a:rPr lang="es-ES" smtClean="0"/>
-              <a:t>18/05/2015</a:t>
+              <a:t>24/05/2015</a:t>
             </a:fld>
             <a:endParaRPr lang="es-ES"/>
           </a:p>
@@ -1882,7 +1882,7 @@
           <a:p>
             <a:fld id="{0835606E-567B-4A60-9BAE-353B30461873}" type="datetimeFigureOut">
               <a:rPr lang="es-ES" smtClean="0"/>
-              <a:t>18/05/2015</a:t>
+              <a:t>24/05/2015</a:t>
             </a:fld>
             <a:endParaRPr lang="es-ES"/>
           </a:p>
@@ -1977,7 +1977,7 @@
           <a:p>
             <a:fld id="{0835606E-567B-4A60-9BAE-353B30461873}" type="datetimeFigureOut">
               <a:rPr lang="es-ES" smtClean="0"/>
-              <a:t>18/05/2015</a:t>
+              <a:t>24/05/2015</a:t>
             </a:fld>
             <a:endParaRPr lang="es-ES"/>
           </a:p>
@@ -2254,7 +2254,7 @@
           <a:p>
             <a:fld id="{0835606E-567B-4A60-9BAE-353B30461873}" type="datetimeFigureOut">
               <a:rPr lang="es-ES" smtClean="0"/>
-              <a:t>18/05/2015</a:t>
+              <a:t>24/05/2015</a:t>
             </a:fld>
             <a:endParaRPr lang="es-ES"/>
           </a:p>
@@ -2507,7 +2507,7 @@
           <a:p>
             <a:fld id="{0835606E-567B-4A60-9BAE-353B30461873}" type="datetimeFigureOut">
               <a:rPr lang="es-ES" smtClean="0"/>
-              <a:t>18/05/2015</a:t>
+              <a:t>24/05/2015</a:t>
             </a:fld>
             <a:endParaRPr lang="es-ES"/>
           </a:p>
@@ -2720,7 +2720,7 @@
           <a:p>
             <a:fld id="{0835606E-567B-4A60-9BAE-353B30461873}" type="datetimeFigureOut">
               <a:rPr lang="es-ES" smtClean="0"/>
-              <a:t>18/05/2015</a:t>
+              <a:t>24/05/2015</a:t>
             </a:fld>
             <a:endParaRPr lang="es-ES"/>
           </a:p>
@@ -3606,14 +3606,14 @@
           <a:lstStyle/>
           <a:p>
             <a:r>
-              <a:rPr lang="es-ES" b="1" dirty="0" smtClean="0">
+              <a:rPr lang="es-ES" b="1" dirty="0">
                 <a:solidFill>
                   <a:schemeClr val="bg1">
                     <a:lumMod val="50000"/>
                   </a:schemeClr>
                 </a:solidFill>
               </a:rPr>
-              <a:t>+</a:t>
+              <a:t>-</a:t>
             </a:r>
             <a:endParaRPr lang="es-ES" b="1" dirty="0">
               <a:solidFill>
@@ -3648,14 +3648,14 @@
           <a:lstStyle/>
           <a:p>
             <a:r>
-              <a:rPr lang="es-ES" b="1" dirty="0">
+              <a:rPr lang="es-ES" b="1" dirty="0" smtClean="0">
                 <a:solidFill>
                   <a:schemeClr val="bg1">
                     <a:lumMod val="50000"/>
                   </a:schemeClr>
                 </a:solidFill>
               </a:rPr>
-              <a:t>-</a:t>
+              <a:t>+</a:t>
             </a:r>
             <a:endParaRPr lang="es-ES" b="1" dirty="0">
               <a:solidFill>

</xml_diff>